<commit_message>
Updating Collateralized Discount Factors
</commit_message>
<xml_diff>
--- a/CollateralizedDiscountFactors/Synthetic Forward FX Replication & Collateralized Discount Factors.pptx
+++ b/CollateralizedDiscountFactors/Synthetic Forward FX Replication & Collateralized Discount Factors.pptx
@@ -4240,8 +4240,8 @@
           </a:p>
         </p:txBody>
       </p:sp>
-      <mc:AlternateContent xmlns:mc="http://schemas.openxmlformats.org/markup-compatibility/2006">
-        <mc:Choice xmlns:a14="http://schemas.microsoft.com/office/drawing/2010/main" Requires="a14">
+      <mc:AlternateContent xmlns:mc="http://schemas.openxmlformats.org/markup-compatibility/2006" xmlns:a14="http://schemas.microsoft.com/office/drawing/2010/main">
+        <mc:Choice Requires="a14">
           <p:sp>
             <p:nvSpPr>
               <p:cNvPr id="8" name="TextBox 7">
@@ -4270,6 +4270,7 @@
               </a:bodyPr>
               <a:lstStyle/>
               <a:p>
+                <a:pPr/>
                 <a14:m>
                   <m:oMathPara xmlns:m="http://schemas.openxmlformats.org/officeDocument/2006/math">
                     <m:oMathParaPr>
@@ -4462,13 +4463,7 @@
                                                 <a:rPr lang="en-GB">
                                                   <a:latin typeface="Cambria Math" panose="02040503050406030204" pitchFamily="18" charset="0"/>
                                                 </a:rPr>
-                                                <m:t>0</m:t>
-                                              </m:r>
-                                              <m:r>
-                                                <a:rPr lang="en-GB">
-                                                  <a:latin typeface="Cambria Math" panose="02040503050406030204" pitchFamily="18" charset="0"/>
-                                                </a:rPr>
-                                                <m:t>,</m:t>
+                                                <m:t>0,</m:t>
                                               </m:r>
                                               <m:r>
                                                 <a:rPr lang="en-GB" i="1">
@@ -4508,16 +4503,7 @@
                                               </a:solidFill>
                                               <a:latin typeface="Cambria Math" panose="02040503050406030204" pitchFamily="18" charset="0"/>
                                             </a:rPr>
-                                            <m:t>𝐸𝑈𝑅</m:t>
-                                          </m:r>
-                                          <m:r>
-                                            <a:rPr lang="en-GB" i="1">
-                                              <a:solidFill>
-                                                <a:srgbClr val="0000FF"/>
-                                              </a:solidFill>
-                                              <a:latin typeface="Cambria Math" panose="02040503050406030204" pitchFamily="18" charset="0"/>
-                                            </a:rPr>
-                                            <m:t>𝐶𝑆𝐴</m:t>
+                                            <m:t>𝐸𝑈𝑅𝐶𝑆𝐴</m:t>
                                           </m:r>
                                         </m:sup>
                                       </m:sSup>
@@ -4551,13 +4537,7 @@
                                                 <a:rPr lang="en-GB">
                                                   <a:latin typeface="Cambria Math" panose="02040503050406030204" pitchFamily="18" charset="0"/>
                                                 </a:rPr>
-                                                <m:t>0</m:t>
-                                              </m:r>
-                                              <m:r>
-                                                <a:rPr lang="en-GB">
-                                                  <a:latin typeface="Cambria Math" panose="02040503050406030204" pitchFamily="18" charset="0"/>
-                                                </a:rPr>
-                                                <m:t>,</m:t>
+                                                <m:t>0,</m:t>
                                               </m:r>
                                               <m:r>
                                                 <a:rPr lang="en-GB" i="1">
@@ -4597,16 +4577,7 @@
                                               </a:solidFill>
                                               <a:latin typeface="Cambria Math" panose="02040503050406030204" pitchFamily="18" charset="0"/>
                                             </a:rPr>
-                                            <m:t>𝐸𝑈𝑅</m:t>
-                                          </m:r>
-                                          <m:r>
-                                            <a:rPr lang="en-GB" i="1">
-                                              <a:solidFill>
-                                                <a:srgbClr val="0000FF"/>
-                                              </a:solidFill>
-                                              <a:latin typeface="Cambria Math" panose="02040503050406030204" pitchFamily="18" charset="0"/>
-                                            </a:rPr>
-                                            <m:t>𝐶𝑆𝐴</m:t>
+                                            <m:t>𝐸𝑈𝑅𝐶𝑆𝐴</m:t>
                                           </m:r>
                                         </m:sup>
                                       </m:sSup>
@@ -4655,16 +4626,7 @@
                               </a:solidFill>
                               <a:latin typeface="Cambria Math" panose="02040503050406030204" pitchFamily="18" charset="0"/>
                             </a:rPr>
-                            <m:t>𝐶</m:t>
-                          </m:r>
-                          <m:r>
-                            <a:rPr lang="en-GB" i="1">
-                              <a:solidFill>
-                                <a:srgbClr val="0000FF"/>
-                              </a:solidFill>
-                              <a:latin typeface="Cambria Math" panose="02040503050406030204" pitchFamily="18" charset="0"/>
-                            </a:rPr>
-                            <m:t>𝑜𝑙𝑙𝑎𝑡𝑒𝑟𝑎𝑙</m:t>
+                            <m:t>𝐶𝑜𝑙𝑙𝑎𝑡𝑒𝑟𝑎𝑙</m:t>
                           </m:r>
                         </m:lim>
                       </m:limLow>
@@ -5045,7 +5007,7 @@
             </p:txBody>
           </p:sp>
         </mc:Choice>
-        <mc:Fallback>
+        <mc:Fallback xmlns="">
           <p:sp>
             <p:nvSpPr>
               <p:cNvPr id="8" name="TextBox 7">
@@ -5432,8 +5394,8 @@
           </a:p>
         </p:txBody>
       </p:sp>
-      <mc:AlternateContent xmlns:mc="http://schemas.openxmlformats.org/markup-compatibility/2006">
-        <mc:Choice xmlns:a14="http://schemas.microsoft.com/office/drawing/2010/main" Requires="a14">
+      <mc:AlternateContent xmlns:mc="http://schemas.openxmlformats.org/markup-compatibility/2006" xmlns:a14="http://schemas.microsoft.com/office/drawing/2010/main">
+        <mc:Choice Requires="a14">
           <p:sp>
             <p:nvSpPr>
               <p:cNvPr id="8" name="TextBox 7">
@@ -6138,7 +6100,7 @@
             </p:txBody>
           </p:sp>
         </mc:Choice>
-        <mc:Fallback>
+        <mc:Fallback xmlns="">
           <p:sp>
             <p:nvSpPr>
               <p:cNvPr id="8" name="TextBox 7">
@@ -6183,8 +6145,8 @@
           </p:sp>
         </mc:Fallback>
       </mc:AlternateContent>
-      <mc:AlternateContent xmlns:mc="http://schemas.openxmlformats.org/markup-compatibility/2006">
-        <mc:Choice xmlns:a14="http://schemas.microsoft.com/office/drawing/2010/main" Requires="a14">
+      <mc:AlternateContent xmlns:mc="http://schemas.openxmlformats.org/markup-compatibility/2006" xmlns:a14="http://schemas.microsoft.com/office/drawing/2010/main">
+        <mc:Choice Requires="a14">
           <p:sp>
             <p:nvSpPr>
               <p:cNvPr id="9" name="TextBox 8">
@@ -6278,16 +6240,7 @@
                                           </a:solidFill>
                                           <a:latin typeface="Cambria Math" panose="02040503050406030204" pitchFamily="18" charset="0"/>
                                         </a:rPr>
-                                        <m:t>0</m:t>
-                                      </m:r>
-                                      <m:r>
-                                        <a:rPr lang="en-GB">
-                                          <a:solidFill>
-                                            <a:srgbClr val="0000FF"/>
-                                          </a:solidFill>
-                                          <a:latin typeface="Cambria Math" panose="02040503050406030204" pitchFamily="18" charset="0"/>
-                                        </a:rPr>
-                                        <m:t>,</m:t>
+                                        <m:t>0,</m:t>
                                       </m:r>
                                       <m:r>
                                         <a:rPr lang="en-GB" i="1">
@@ -6333,16 +6286,7 @@
                                       </a:solidFill>
                                       <a:latin typeface="Cambria Math" panose="02040503050406030204" pitchFamily="18" charset="0"/>
                                     </a:rPr>
-                                    <m:t>𝐸𝑈𝑅</m:t>
-                                  </m:r>
-                                  <m:r>
-                                    <a:rPr lang="en-GB" i="1">
-                                      <a:solidFill>
-                                        <a:srgbClr val="0000FF"/>
-                                      </a:solidFill>
-                                      <a:latin typeface="Cambria Math" panose="02040503050406030204" pitchFamily="18" charset="0"/>
-                                    </a:rPr>
-                                    <m:t>𝐶𝑆𝐴</m:t>
+                                    <m:t>𝐸𝑈𝑅𝐶𝑆𝐴</m:t>
                                   </m:r>
                                 </m:sup>
                               </m:sSup>
@@ -6376,13 +6320,7 @@
                                         <a:rPr lang="en-GB">
                                           <a:latin typeface="Cambria Math" panose="02040503050406030204" pitchFamily="18" charset="0"/>
                                         </a:rPr>
-                                        <m:t>0</m:t>
-                                      </m:r>
-                                      <m:r>
-                                        <a:rPr lang="en-GB">
-                                          <a:latin typeface="Cambria Math" panose="02040503050406030204" pitchFamily="18" charset="0"/>
-                                        </a:rPr>
-                                        <m:t>,</m:t>
+                                        <m:t>0,</m:t>
                                       </m:r>
                                       <m:r>
                                         <a:rPr lang="en-GB" i="1">
@@ -6595,7 +6533,7 @@
             </p:txBody>
           </p:sp>
         </mc:Choice>
-        <mc:Fallback>
+        <mc:Fallback xmlns="">
           <p:sp>
             <p:nvSpPr>
               <p:cNvPr id="9" name="TextBox 8">
@@ -6640,8 +6578,8 @@
           </p:sp>
         </mc:Fallback>
       </mc:AlternateContent>
-      <mc:AlternateContent xmlns:mc="http://schemas.openxmlformats.org/markup-compatibility/2006">
-        <mc:Choice xmlns:a14="http://schemas.microsoft.com/office/drawing/2010/main" Requires="a14">
+      <mc:AlternateContent xmlns:mc="http://schemas.openxmlformats.org/markup-compatibility/2006" xmlns:a14="http://schemas.microsoft.com/office/drawing/2010/main">
+        <mc:Choice Requires="a14">
           <p:sp>
             <p:nvSpPr>
               <p:cNvPr id="5" name="TextBox 4">
@@ -7095,7 +7033,7 @@
             </p:txBody>
           </p:sp>
         </mc:Choice>
-        <mc:Fallback>
+        <mc:Fallback xmlns="">
           <p:sp>
             <p:nvSpPr>
               <p:cNvPr id="5" name="TextBox 4">
@@ -7469,8 +7407,8 @@
           </a:p>
         </p:txBody>
       </p:sp>
-      <mc:AlternateContent xmlns:mc="http://schemas.openxmlformats.org/markup-compatibility/2006">
-        <mc:Choice xmlns:a14="http://schemas.microsoft.com/office/drawing/2010/main" Requires="a14">
+      <mc:AlternateContent xmlns:mc="http://schemas.openxmlformats.org/markup-compatibility/2006" xmlns:a14="http://schemas.microsoft.com/office/drawing/2010/main">
+        <mc:Choice Requires="a14">
           <p:sp>
             <p:nvSpPr>
               <p:cNvPr id="8" name="TextBox 7">
@@ -8175,7 +8113,7 @@
             </p:txBody>
           </p:sp>
         </mc:Choice>
-        <mc:Fallback>
+        <mc:Fallback xmlns="">
           <p:sp>
             <p:nvSpPr>
               <p:cNvPr id="8" name="TextBox 7">
@@ -8220,8 +8158,8 @@
           </p:sp>
         </mc:Fallback>
       </mc:AlternateContent>
-      <mc:AlternateContent xmlns:mc="http://schemas.openxmlformats.org/markup-compatibility/2006">
-        <mc:Choice xmlns:a14="http://schemas.microsoft.com/office/drawing/2010/main" Requires="a14">
+      <mc:AlternateContent xmlns:mc="http://schemas.openxmlformats.org/markup-compatibility/2006" xmlns:a14="http://schemas.microsoft.com/office/drawing/2010/main">
+        <mc:Choice Requires="a14">
           <p:sp>
             <p:nvSpPr>
               <p:cNvPr id="9" name="TextBox 8">
@@ -8644,7 +8582,7 @@
             </p:txBody>
           </p:sp>
         </mc:Choice>
-        <mc:Fallback>
+        <mc:Fallback xmlns="">
           <p:sp>
             <p:nvSpPr>
               <p:cNvPr id="9" name="TextBox 8">
@@ -8689,8 +8627,8 @@
           </p:sp>
         </mc:Fallback>
       </mc:AlternateContent>
-      <mc:AlternateContent xmlns:mc="http://schemas.openxmlformats.org/markup-compatibility/2006">
-        <mc:Choice xmlns:a14="http://schemas.microsoft.com/office/drawing/2010/main" Requires="a14">
+      <mc:AlternateContent xmlns:mc="http://schemas.openxmlformats.org/markup-compatibility/2006" xmlns:a14="http://schemas.microsoft.com/office/drawing/2010/main">
+        <mc:Choice Requires="a14">
           <p:sp>
             <p:nvSpPr>
               <p:cNvPr id="6" name="TextBox 5">
@@ -8812,16 +8750,7 @@
                               </a:solidFill>
                               <a:latin typeface="Cambria Math" panose="02040503050406030204" pitchFamily="18" charset="0"/>
                             </a:rPr>
-                            <m:t>𝐸𝑈𝑅</m:t>
-                          </m:r>
-                          <m:r>
-                            <a:rPr lang="en-GB" i="1">
-                              <a:solidFill>
-                                <a:srgbClr val="0000FF"/>
-                              </a:solidFill>
-                              <a:latin typeface="Cambria Math" panose="02040503050406030204" pitchFamily="18" charset="0"/>
-                            </a:rPr>
-                            <m:t>𝐶𝑆𝐴</m:t>
+                            <m:t>𝐸𝑈𝑅𝐶𝑆𝐴</m:t>
                           </m:r>
                         </m:sup>
                       </m:sSup>
@@ -8896,13 +8825,7 @@
                             <a:rPr lang="en-GB" i="1">
                               <a:latin typeface="Cambria Math" panose="02040503050406030204" pitchFamily="18" charset="0"/>
                             </a:rPr>
-                            <m:t>𝐸𝑈𝑅</m:t>
-                          </m:r>
-                          <m:r>
-                            <a:rPr lang="en-GB" i="1">
-                              <a:latin typeface="Cambria Math" panose="02040503050406030204" pitchFamily="18" charset="0"/>
-                            </a:rPr>
-                            <m:t>𝐶𝑆𝐴</m:t>
+                            <m:t>𝐸𝑈𝑅𝐶𝑆𝐴</m:t>
                           </m:r>
                         </m:sup>
                       </m:sSup>
@@ -9050,7 +8973,7 @@
             </p:txBody>
           </p:sp>
         </mc:Choice>
-        <mc:Fallback>
+        <mc:Fallback xmlns="">
           <p:sp>
             <p:nvSpPr>
               <p:cNvPr id="6" name="TextBox 5">
@@ -10682,8 +10605,8 @@
           </p:sp>
         </mc:Fallback>
       </mc:AlternateContent>
-      <mc:AlternateContent xmlns:mc="http://schemas.openxmlformats.org/markup-compatibility/2006">
-        <mc:Choice xmlns:a14="http://schemas.microsoft.com/office/drawing/2010/main" Requires="a14">
+      <mc:AlternateContent xmlns:mc="http://schemas.openxmlformats.org/markup-compatibility/2006" xmlns:a14="http://schemas.microsoft.com/office/drawing/2010/main">
+        <mc:Choice Requires="a14">
           <p:sp>
             <p:nvSpPr>
               <p:cNvPr id="24" name="TextBox 23">
@@ -11064,7 +10987,7 @@
             </p:txBody>
           </p:sp>
         </mc:Choice>
-        <mc:Fallback>
+        <mc:Fallback xmlns="">
           <p:sp>
             <p:nvSpPr>
               <p:cNvPr id="24" name="TextBox 23">
@@ -11738,8 +11661,8 @@
           </a:p>
         </p:txBody>
       </p:sp>
-      <mc:AlternateContent xmlns:mc="http://schemas.openxmlformats.org/markup-compatibility/2006">
-        <mc:Choice xmlns:a14="http://schemas.microsoft.com/office/drawing/2010/main" Requires="a14">
+      <mc:AlternateContent xmlns:mc="http://schemas.openxmlformats.org/markup-compatibility/2006" xmlns:a14="http://schemas.microsoft.com/office/drawing/2010/main">
+        <mc:Choice Requires="a14">
           <p:sp>
             <p:nvSpPr>
               <p:cNvPr id="5" name="TextBox 4">
@@ -12474,7 +12397,7 @@
             </p:txBody>
           </p:sp>
         </mc:Choice>
-        <mc:Fallback>
+        <mc:Fallback xmlns="">
           <p:sp>
             <p:nvSpPr>
               <p:cNvPr id="5" name="TextBox 4">
@@ -12681,8 +12604,8 @@
           </a:p>
         </p:txBody>
       </p:sp>
-      <mc:AlternateContent xmlns:mc="http://schemas.openxmlformats.org/markup-compatibility/2006">
-        <mc:Choice xmlns:a14="http://schemas.microsoft.com/office/drawing/2010/main" Requires="a14">
+      <mc:AlternateContent xmlns:mc="http://schemas.openxmlformats.org/markup-compatibility/2006" xmlns:a14="http://schemas.microsoft.com/office/drawing/2010/main">
+        <mc:Choice Requires="a14">
           <p:sp>
             <p:nvSpPr>
               <p:cNvPr id="4" name="TextBox 3">
@@ -13053,7 +12976,7 @@
             </p:txBody>
           </p:sp>
         </mc:Choice>
-        <mc:Fallback>
+        <mc:Fallback xmlns="">
           <p:sp>
             <p:nvSpPr>
               <p:cNvPr id="4" name="TextBox 3">
@@ -14788,8 +14711,8 @@
           </a:p>
         </p:txBody>
       </p:sp>
-      <mc:AlternateContent xmlns:mc="http://schemas.openxmlformats.org/markup-compatibility/2006">
-        <mc:Choice xmlns:a14="http://schemas.microsoft.com/office/drawing/2010/main" Requires="a14">
+      <mc:AlternateContent xmlns:mc="http://schemas.openxmlformats.org/markup-compatibility/2006" xmlns:a14="http://schemas.microsoft.com/office/drawing/2010/main">
+        <mc:Choice Requires="a14">
           <p:sp>
             <p:nvSpPr>
               <p:cNvPr id="6" name="TextBox 5">
@@ -15011,13 +14934,7 @@
                                                 <a:rPr lang="en-GB">
                                                   <a:latin typeface="Cambria Math" panose="02040503050406030204" pitchFamily="18" charset="0"/>
                                                 </a:rPr>
-                                                <m:t>0</m:t>
-                                              </m:r>
-                                              <m:r>
-                                                <a:rPr lang="en-GB">
-                                                  <a:latin typeface="Cambria Math" panose="02040503050406030204" pitchFamily="18" charset="0"/>
-                                                </a:rPr>
-                                                <m:t>,</m:t>
+                                                <m:t>0,</m:t>
                                               </m:r>
                                               <m:r>
                                                 <a:rPr lang="en-GB" i="1">
@@ -15057,16 +14974,7 @@
                                               </a:solidFill>
                                               <a:latin typeface="Cambria Math" panose="02040503050406030204" pitchFamily="18" charset="0"/>
                                             </a:rPr>
-                                            <m:t>𝐸𝑈𝑅</m:t>
-                                          </m:r>
-                                          <m:r>
-                                            <a:rPr lang="en-GB" i="1">
-                                              <a:solidFill>
-                                                <a:srgbClr val="0000FF"/>
-                                              </a:solidFill>
-                                              <a:latin typeface="Cambria Math" panose="02040503050406030204" pitchFamily="18" charset="0"/>
-                                            </a:rPr>
-                                            <m:t>𝐶𝑆𝐴</m:t>
+                                            <m:t>𝐸𝑈𝑅𝐶𝑆𝐴</m:t>
                                           </m:r>
                                         </m:sup>
                                       </m:sSup>
@@ -15100,13 +15008,7 @@
                                                 <a:rPr lang="en-GB">
                                                   <a:latin typeface="Cambria Math" panose="02040503050406030204" pitchFamily="18" charset="0"/>
                                                 </a:rPr>
-                                                <m:t>0</m:t>
-                                              </m:r>
-                                              <m:r>
-                                                <a:rPr lang="en-GB">
-                                                  <a:latin typeface="Cambria Math" panose="02040503050406030204" pitchFamily="18" charset="0"/>
-                                                </a:rPr>
-                                                <m:t>,</m:t>
+                                                <m:t>0,</m:t>
                                               </m:r>
                                               <m:r>
                                                 <a:rPr lang="en-GB" i="1">
@@ -15146,16 +15048,7 @@
                                               </a:solidFill>
                                               <a:latin typeface="Cambria Math" panose="02040503050406030204" pitchFamily="18" charset="0"/>
                                             </a:rPr>
-                                            <m:t>𝐸𝑈𝑅</m:t>
-                                          </m:r>
-                                          <m:r>
-                                            <a:rPr lang="en-GB" i="1">
-                                              <a:solidFill>
-                                                <a:srgbClr val="0000FF"/>
-                                              </a:solidFill>
-                                              <a:latin typeface="Cambria Math" panose="02040503050406030204" pitchFamily="18" charset="0"/>
-                                            </a:rPr>
-                                            <m:t>𝐶𝑆𝐴</m:t>
+                                            <m:t>𝐸𝑈𝑅𝐶𝑆𝐴</m:t>
                                           </m:r>
                                         </m:sup>
                                       </m:sSup>
@@ -15204,16 +15097,7 @@
                               </a:solidFill>
                               <a:latin typeface="Cambria Math" panose="02040503050406030204" pitchFamily="18" charset="0"/>
                             </a:rPr>
-                            <m:t>𝐶</m:t>
-                          </m:r>
-                          <m:r>
-                            <a:rPr lang="en-GB" i="1">
-                              <a:solidFill>
-                                <a:srgbClr val="0000FF"/>
-                              </a:solidFill>
-                              <a:latin typeface="Cambria Math" panose="02040503050406030204" pitchFamily="18" charset="0"/>
-                            </a:rPr>
-                            <m:t>𝑜𝑙𝑙𝑎𝑡𝑒𝑟𝑎𝑙</m:t>
+                            <m:t>𝐶𝑜𝑙𝑙𝑎𝑡𝑒𝑟𝑎𝑙</m:t>
                           </m:r>
                         </m:lim>
                       </m:limLow>
@@ -15594,7 +15478,7 @@
             </p:txBody>
           </p:sp>
         </mc:Choice>
-        <mc:Fallback>
+        <mc:Fallback xmlns="">
           <p:sp>
             <p:nvSpPr>
               <p:cNvPr id="6" name="TextBox 5">
@@ -15639,8 +15523,8 @@
           </p:sp>
         </mc:Fallback>
       </mc:AlternateContent>
-      <mc:AlternateContent xmlns:mc="http://schemas.openxmlformats.org/markup-compatibility/2006">
-        <mc:Choice xmlns:a14="http://schemas.microsoft.com/office/drawing/2010/main" Requires="a14">
+      <mc:AlternateContent xmlns:mc="http://schemas.openxmlformats.org/markup-compatibility/2006" xmlns:a14="http://schemas.microsoft.com/office/drawing/2010/main">
+        <mc:Choice Requires="a14">
           <p:sp>
             <p:nvSpPr>
               <p:cNvPr id="7" name="TextBox 6">
@@ -16044,7 +15928,7 @@
             </p:txBody>
           </p:sp>
         </mc:Choice>
-        <mc:Fallback>
+        <mc:Fallback xmlns="">
           <p:sp>
             <p:nvSpPr>
               <p:cNvPr id="7" name="TextBox 6">
@@ -16205,8 +16089,8 @@
           </a:p>
         </p:txBody>
       </p:sp>
-      <mc:AlternateContent xmlns:mc="http://schemas.openxmlformats.org/markup-compatibility/2006">
-        <mc:Choice xmlns:a14="http://schemas.microsoft.com/office/drawing/2010/main" Requires="a14">
+      <mc:AlternateContent xmlns:mc="http://schemas.openxmlformats.org/markup-compatibility/2006" xmlns:a14="http://schemas.microsoft.com/office/drawing/2010/main">
+        <mc:Choice Requires="a14">
           <p:sp>
             <p:nvSpPr>
               <p:cNvPr id="4" name="TextBox 3">
@@ -16443,7 +16327,7 @@
             </p:txBody>
           </p:sp>
         </mc:Choice>
-        <mc:Fallback>
+        <mc:Fallback xmlns="">
           <p:sp>
             <p:nvSpPr>
               <p:cNvPr id="4" name="TextBox 3">
@@ -16518,6 +16402,7 @@
               </a:bodyPr>
               <a:lstStyle/>
               <a:p>
+                <a:pPr/>
                 <a14:m>
                   <m:oMathPara xmlns:m="http://schemas.openxmlformats.org/officeDocument/2006/math">
                     <m:oMathParaPr>
@@ -16919,7 +16804,7 @@
                               </a:solidFill>
                               <a:latin typeface="Cambria Math" panose="02040503050406030204" pitchFamily="18" charset="0"/>
                             </a:rPr>
-                            <m:t> |</m:t>
+                            <m:t> </m:t>
                           </m:r>
                           <m:r>
                             <a:rPr lang="en-GB" b="0" i="1" smtClean="0">
@@ -16966,7 +16851,7 @@
               <a:blipFill>
                 <a:blip r:embed="rId3"/>
                 <a:stretch>
-                  <a:fillRect l="-699" b="-15730"/>
+                  <a:fillRect l="-699" b="-14607"/>
                 </a:stretch>
               </a:blipFill>
             </p:spPr>
@@ -17220,6 +17105,7 @@
               </a:bodyPr>
               <a:lstStyle/>
               <a:p>
+                <a:pPr/>
                 <a14:m>
                   <m:oMathPara xmlns:m="http://schemas.openxmlformats.org/officeDocument/2006/math">
                     <m:oMathParaPr>
@@ -17705,7 +17591,7 @@
                               </a:solidFill>
                               <a:latin typeface="Cambria Math" panose="02040503050406030204" pitchFamily="18" charset="0"/>
                             </a:rPr>
-                            <m:t> |</m:t>
+                            <m:t> </m:t>
                           </m:r>
                           <m:r>
                             <a:rPr lang="en-GB" b="0" i="1" smtClean="0">
@@ -17752,7 +17638,7 @@
               <a:blipFill>
                 <a:blip r:embed="rId3"/>
                 <a:stretch>
-                  <a:fillRect l="-787" b="-15730"/>
+                  <a:fillRect l="-787" b="-14607"/>
                 </a:stretch>
               </a:blipFill>
             </p:spPr>

</xml_diff>